<commit_message>
Site updated: 2024-03-15 15:04:14
</commit_message>
<xml_diff>
--- a/imgs/TiKV/struct.pptx
+++ b/imgs/TiKV/struct.pptx
@@ -5,11 +5,12 @@
     <p:sldMasterId id="2147483648" r:id="rId1"/>
   </p:sldMasterIdLst>
   <p:notesMasterIdLst>
-    <p:notesMasterId r:id="rId4"/>
+    <p:notesMasterId r:id="rId5"/>
   </p:notesMasterIdLst>
   <p:sldIdLst>
     <p:sldId id="256" r:id="rId2"/>
     <p:sldId id="257" r:id="rId3"/>
+    <p:sldId id="258" r:id="rId4"/>
   </p:sldIdLst>
   <p:sldSz cx="12192000" cy="6858000"/>
   <p:notesSz cx="6858000" cy="9144000"/>
@@ -198,7 +199,7 @@
           <a:p>
             <a:fld id="{A2F327F1-EEF4-874B-98DC-2A5FE7F8E624}" type="datetimeFigureOut">
               <a:rPr kumimoji="1" lang="zh-CN" altLang="en-US" smtClean="0"/>
-              <a:t>2023/12/7</a:t>
+              <a:t>2024/3/13</a:t>
             </a:fld>
             <a:endParaRPr kumimoji="1" lang="zh-CN" altLang="en-US"/>
           </a:p>
@@ -784,7 +785,7 @@
           <a:p>
             <a:fld id="{24955AEB-B70C-5C49-AA42-AAD9BD194E64}" type="datetimeFigureOut">
               <a:rPr kumimoji="1" lang="zh-CN" altLang="en-US" smtClean="0"/>
-              <a:t>2023/12/7</a:t>
+              <a:t>2024/3/13</a:t>
             </a:fld>
             <a:endParaRPr kumimoji="1" lang="zh-CN" altLang="en-US"/>
           </a:p>
@@ -982,7 +983,7 @@
           <a:p>
             <a:fld id="{24955AEB-B70C-5C49-AA42-AAD9BD194E64}" type="datetimeFigureOut">
               <a:rPr kumimoji="1" lang="zh-CN" altLang="en-US" smtClean="0"/>
-              <a:t>2023/12/7</a:t>
+              <a:t>2024/3/13</a:t>
             </a:fld>
             <a:endParaRPr kumimoji="1" lang="zh-CN" altLang="en-US"/>
           </a:p>
@@ -1190,7 +1191,7 @@
           <a:p>
             <a:fld id="{24955AEB-B70C-5C49-AA42-AAD9BD194E64}" type="datetimeFigureOut">
               <a:rPr kumimoji="1" lang="zh-CN" altLang="en-US" smtClean="0"/>
-              <a:t>2023/12/7</a:t>
+              <a:t>2024/3/13</a:t>
             </a:fld>
             <a:endParaRPr kumimoji="1" lang="zh-CN" altLang="en-US"/>
           </a:p>
@@ -1388,7 +1389,7 @@
           <a:p>
             <a:fld id="{24955AEB-B70C-5C49-AA42-AAD9BD194E64}" type="datetimeFigureOut">
               <a:rPr kumimoji="1" lang="zh-CN" altLang="en-US" smtClean="0"/>
-              <a:t>2023/12/7</a:t>
+              <a:t>2024/3/13</a:t>
             </a:fld>
             <a:endParaRPr kumimoji="1" lang="zh-CN" altLang="en-US"/>
           </a:p>
@@ -1663,7 +1664,7 @@
           <a:p>
             <a:fld id="{24955AEB-B70C-5C49-AA42-AAD9BD194E64}" type="datetimeFigureOut">
               <a:rPr kumimoji="1" lang="zh-CN" altLang="en-US" smtClean="0"/>
-              <a:t>2023/12/7</a:t>
+              <a:t>2024/3/13</a:t>
             </a:fld>
             <a:endParaRPr kumimoji="1" lang="zh-CN" altLang="en-US"/>
           </a:p>
@@ -1928,7 +1929,7 @@
           <a:p>
             <a:fld id="{24955AEB-B70C-5C49-AA42-AAD9BD194E64}" type="datetimeFigureOut">
               <a:rPr kumimoji="1" lang="zh-CN" altLang="en-US" smtClean="0"/>
-              <a:t>2023/12/7</a:t>
+              <a:t>2024/3/13</a:t>
             </a:fld>
             <a:endParaRPr kumimoji="1" lang="zh-CN" altLang="en-US"/>
           </a:p>
@@ -2340,7 +2341,7 @@
           <a:p>
             <a:fld id="{24955AEB-B70C-5C49-AA42-AAD9BD194E64}" type="datetimeFigureOut">
               <a:rPr kumimoji="1" lang="zh-CN" altLang="en-US" smtClean="0"/>
-              <a:t>2023/12/7</a:t>
+              <a:t>2024/3/13</a:t>
             </a:fld>
             <a:endParaRPr kumimoji="1" lang="zh-CN" altLang="en-US"/>
           </a:p>
@@ -2481,7 +2482,7 @@
           <a:p>
             <a:fld id="{24955AEB-B70C-5C49-AA42-AAD9BD194E64}" type="datetimeFigureOut">
               <a:rPr kumimoji="1" lang="zh-CN" altLang="en-US" smtClean="0"/>
-              <a:t>2023/12/7</a:t>
+              <a:t>2024/3/13</a:t>
             </a:fld>
             <a:endParaRPr kumimoji="1" lang="zh-CN" altLang="en-US"/>
           </a:p>
@@ -2594,7 +2595,7 @@
           <a:p>
             <a:fld id="{24955AEB-B70C-5C49-AA42-AAD9BD194E64}" type="datetimeFigureOut">
               <a:rPr kumimoji="1" lang="zh-CN" altLang="en-US" smtClean="0"/>
-              <a:t>2023/12/7</a:t>
+              <a:t>2024/3/13</a:t>
             </a:fld>
             <a:endParaRPr kumimoji="1" lang="zh-CN" altLang="en-US"/>
           </a:p>
@@ -2905,7 +2906,7 @@
           <a:p>
             <a:fld id="{24955AEB-B70C-5C49-AA42-AAD9BD194E64}" type="datetimeFigureOut">
               <a:rPr kumimoji="1" lang="zh-CN" altLang="en-US" smtClean="0"/>
-              <a:t>2023/12/7</a:t>
+              <a:t>2024/3/13</a:t>
             </a:fld>
             <a:endParaRPr kumimoji="1" lang="zh-CN" altLang="en-US"/>
           </a:p>
@@ -3193,7 +3194,7 @@
           <a:p>
             <a:fld id="{24955AEB-B70C-5C49-AA42-AAD9BD194E64}" type="datetimeFigureOut">
               <a:rPr kumimoji="1" lang="zh-CN" altLang="en-US" smtClean="0"/>
-              <a:t>2023/12/7</a:t>
+              <a:t>2024/3/13</a:t>
             </a:fld>
             <a:endParaRPr kumimoji="1" lang="zh-CN" altLang="en-US"/>
           </a:p>
@@ -3434,7 +3435,7 @@
           <a:p>
             <a:fld id="{24955AEB-B70C-5C49-AA42-AAD9BD194E64}" type="datetimeFigureOut">
               <a:rPr kumimoji="1" lang="zh-CN" altLang="en-US" smtClean="0"/>
-              <a:t>2023/12/7</a:t>
+              <a:t>2024/3/13</a:t>
             </a:fld>
             <a:endParaRPr kumimoji="1" lang="zh-CN" altLang="en-US"/>
           </a:p>
@@ -3865,8 +3866,8 @@
         </p:nvSpPr>
         <p:spPr>
           <a:xfrm>
-            <a:off x="1181127" y="70694"/>
-            <a:ext cx="10656646" cy="6209014"/>
+            <a:off x="1655367" y="893378"/>
+            <a:ext cx="10182406" cy="5386329"/>
           </a:xfrm>
           <a:prstGeom prst="roundRect">
             <a:avLst>
@@ -3914,7 +3915,7 @@
         </p:nvSpPr>
         <p:spPr>
           <a:xfrm>
-            <a:off x="1200568" y="5898647"/>
+            <a:off x="1655367" y="5910375"/>
             <a:ext cx="1345240" cy="369332"/>
           </a:xfrm>
           <a:prstGeom prst="rect">
@@ -6035,6 +6036,91 @@
           </a:fontRef>
         </p:style>
       </p:cxnSp>
+      <p:sp>
+        <p:nvSpPr>
+          <p:cNvPr id="3" name="圆角矩形 2">
+            <a:extLst>
+              <a:ext uri="{FF2B5EF4-FFF2-40B4-BE49-F238E27FC236}">
+                <a16:creationId xmlns:a16="http://schemas.microsoft.com/office/drawing/2014/main" id="{0B6B15ED-47D9-4E8B-EF4F-FFB44F48A862}"/>
+              </a:ext>
+            </a:extLst>
+          </p:cNvPr>
+          <p:cNvSpPr/>
+          <p:nvPr/>
+        </p:nvSpPr>
+        <p:spPr>
+          <a:xfrm>
+            <a:off x="792181" y="70694"/>
+            <a:ext cx="11284205" cy="6361414"/>
+          </a:xfrm>
+          <a:prstGeom prst="roundRect">
+            <a:avLst>
+              <a:gd name="adj" fmla="val 2752"/>
+            </a:avLst>
+          </a:prstGeom>
+          <a:noFill/>
+        </p:spPr>
+        <p:style>
+          <a:lnRef idx="2">
+            <a:schemeClr val="accent1">
+              <a:shade val="15000"/>
+            </a:schemeClr>
+          </a:lnRef>
+          <a:fillRef idx="1">
+            <a:schemeClr val="accent1"/>
+          </a:fillRef>
+          <a:effectRef idx="0">
+            <a:schemeClr val="accent1"/>
+          </a:effectRef>
+          <a:fontRef idx="minor">
+            <a:schemeClr val="lt1"/>
+          </a:fontRef>
+        </p:style>
+        <p:txBody>
+          <a:bodyPr rtlCol="0" anchor="ctr"/>
+          <a:lstStyle/>
+          <a:p>
+            <a:pPr algn="ctr"/>
+            <a:endParaRPr kumimoji="1" lang="zh-CN" altLang="en-US"/>
+          </a:p>
+        </p:txBody>
+      </p:sp>
+      <p:sp>
+        <p:nvSpPr>
+          <p:cNvPr id="17" name="文本框 16">
+            <a:extLst>
+              <a:ext uri="{FF2B5EF4-FFF2-40B4-BE49-F238E27FC236}">
+                <a16:creationId xmlns:a16="http://schemas.microsoft.com/office/drawing/2014/main" id="{8337080D-0D73-BC69-D7EE-91344DF265DB}"/>
+              </a:ext>
+            </a:extLst>
+          </p:cNvPr>
+          <p:cNvSpPr txBox="1"/>
+          <p:nvPr/>
+        </p:nvSpPr>
+        <p:spPr>
+          <a:xfrm>
+            <a:off x="792181" y="70693"/>
+            <a:ext cx="805029" cy="369332"/>
+          </a:xfrm>
+          <a:prstGeom prst="rect">
+            <a:avLst/>
+          </a:prstGeom>
+          <a:noFill/>
+        </p:spPr>
+        <p:txBody>
+          <a:bodyPr wrap="none" rtlCol="0">
+            <a:spAutoFit/>
+          </a:bodyPr>
+          <a:lstStyle/>
+          <a:p>
+            <a:r>
+              <a:rPr kumimoji="1" lang="en-US" altLang="zh-CN" dirty="0"/>
+              <a:t>Server</a:t>
+            </a:r>
+            <a:endParaRPr kumimoji="1" lang="zh-CN" altLang="en-US" dirty="0"/>
+          </a:p>
+        </p:txBody>
+      </p:sp>
     </p:spTree>
     <p:extLst>
       <p:ext uri="{BB962C8B-B14F-4D97-AF65-F5344CB8AC3E}">
@@ -6974,8 +7060,8 @@
         </p:nvSpPr>
         <p:spPr>
           <a:xfrm>
-            <a:off x="6120997" y="1222726"/>
-            <a:ext cx="1681770" cy="507600"/>
+            <a:off x="6055010" y="1222726"/>
+            <a:ext cx="1810817" cy="507600"/>
           </a:xfrm>
           <a:prstGeom prst="roundRect">
             <a:avLst/>
@@ -7007,7 +7093,7 @@
             <a:pPr algn="ctr"/>
             <a:r>
               <a:rPr kumimoji="1" lang="en-US" altLang="zh-CN" dirty="0" err="1"/>
-              <a:t>resolveRunner</a:t>
+              <a:t>ServerTransport</a:t>
             </a:r>
             <a:endParaRPr kumimoji="1" lang="en-US" altLang="zh-CN" dirty="0"/>
           </a:p>
@@ -7070,9 +7156,9 @@
           <p:nvPr/>
         </p:nvCxnSpPr>
         <p:spPr>
-          <a:xfrm flipV="1">
-            <a:off x="6961882" y="1730326"/>
-            <a:ext cx="0" cy="1420404"/>
+          <a:xfrm flipH="1" flipV="1">
+            <a:off x="6960419" y="1730326"/>
+            <a:ext cx="1463" cy="1420404"/>
           </a:xfrm>
           <a:prstGeom prst="straightConnector1">
             <a:avLst/>
@@ -7117,8 +7203,8 @@
         </p:nvCxnSpPr>
         <p:spPr>
           <a:xfrm flipV="1">
-            <a:off x="6961882" y="896911"/>
-            <a:ext cx="996229" cy="325815"/>
+            <a:off x="6960419" y="896911"/>
+            <a:ext cx="997692" cy="325815"/>
           </a:xfrm>
           <a:prstGeom prst="straightConnector1">
             <a:avLst/>
@@ -7164,7 +7250,7 @@
         <p:spPr>
           <a:xfrm flipH="1" flipV="1">
             <a:off x="5844141" y="896911"/>
-            <a:ext cx="1117741" cy="325815"/>
+            <a:ext cx="1116278" cy="325815"/>
           </a:xfrm>
           <a:prstGeom prst="straightConnector1">
             <a:avLst/>
@@ -8861,6 +8947,1473 @@
     <p:extLst>
       <p:ext uri="{BB962C8B-B14F-4D97-AF65-F5344CB8AC3E}">
         <p14:creationId xmlns:p14="http://schemas.microsoft.com/office/powerpoint/2010/main" val="1984200087"/>
+      </p:ext>
+    </p:extLst>
+  </p:cSld>
+  <p:clrMapOvr>
+    <a:masterClrMapping/>
+  </p:clrMapOvr>
+</p:sld>
+</file>
+
+<file path=ppt/slides/slide3.xml><?xml version="1.0" encoding="utf-8"?>
+<p:sld xmlns:a="http://schemas.openxmlformats.org/drawingml/2006/main" xmlns:r="http://schemas.openxmlformats.org/officeDocument/2006/relationships" xmlns:p="http://schemas.openxmlformats.org/presentationml/2006/main">
+  <p:cSld>
+    <p:spTree>
+      <p:nvGrpSpPr>
+        <p:cNvPr id="1" name=""/>
+        <p:cNvGrpSpPr/>
+        <p:nvPr/>
+      </p:nvGrpSpPr>
+      <p:grpSpPr>
+        <a:xfrm>
+          <a:off x="0" y="0"/>
+          <a:ext cx="0" cy="0"/>
+          <a:chOff x="0" y="0"/>
+          <a:chExt cx="0" cy="0"/>
+        </a:xfrm>
+      </p:grpSpPr>
+      <p:sp>
+        <p:nvSpPr>
+          <p:cNvPr id="4" name="圆角矩形 3">
+            <a:extLst>
+              <a:ext uri="{FF2B5EF4-FFF2-40B4-BE49-F238E27FC236}">
+                <a16:creationId xmlns:a16="http://schemas.microsoft.com/office/drawing/2014/main" id="{BF28EA0A-C404-E6FD-97D5-7AC0CFF9A4EB}"/>
+              </a:ext>
+            </a:extLst>
+          </p:cNvPr>
+          <p:cNvSpPr/>
+          <p:nvPr/>
+        </p:nvSpPr>
+        <p:spPr>
+          <a:xfrm>
+            <a:off x="792181" y="3252805"/>
+            <a:ext cx="11284205" cy="3179302"/>
+          </a:xfrm>
+          <a:prstGeom prst="roundRect">
+            <a:avLst>
+              <a:gd name="adj" fmla="val 2752"/>
+            </a:avLst>
+          </a:prstGeom>
+          <a:noFill/>
+        </p:spPr>
+        <p:style>
+          <a:lnRef idx="2">
+            <a:schemeClr val="accent1">
+              <a:shade val="15000"/>
+            </a:schemeClr>
+          </a:lnRef>
+          <a:fillRef idx="1">
+            <a:schemeClr val="accent1"/>
+          </a:fillRef>
+          <a:effectRef idx="0">
+            <a:schemeClr val="accent1"/>
+          </a:effectRef>
+          <a:fontRef idx="minor">
+            <a:schemeClr val="lt1"/>
+          </a:fontRef>
+        </p:style>
+        <p:txBody>
+          <a:bodyPr rtlCol="0" anchor="ctr"/>
+          <a:lstStyle/>
+          <a:p>
+            <a:pPr algn="ctr"/>
+            <a:endParaRPr kumimoji="1" lang="zh-CN" altLang="en-US"/>
+          </a:p>
+        </p:txBody>
+      </p:sp>
+      <p:sp>
+        <p:nvSpPr>
+          <p:cNvPr id="5" name="文本框 4">
+            <a:extLst>
+              <a:ext uri="{FF2B5EF4-FFF2-40B4-BE49-F238E27FC236}">
+                <a16:creationId xmlns:a16="http://schemas.microsoft.com/office/drawing/2014/main" id="{C0E70EA6-BB79-C5B5-02E2-B7E472C8DE44}"/>
+              </a:ext>
+            </a:extLst>
+          </p:cNvPr>
+          <p:cNvSpPr txBox="1"/>
+          <p:nvPr/>
+        </p:nvSpPr>
+        <p:spPr>
+          <a:xfrm>
+            <a:off x="792181" y="3252805"/>
+            <a:ext cx="805029" cy="369332"/>
+          </a:xfrm>
+          <a:prstGeom prst="rect">
+            <a:avLst/>
+          </a:prstGeom>
+          <a:noFill/>
+        </p:spPr>
+        <p:txBody>
+          <a:bodyPr wrap="none" rtlCol="0">
+            <a:spAutoFit/>
+          </a:bodyPr>
+          <a:lstStyle/>
+          <a:p>
+            <a:r>
+              <a:rPr kumimoji="1" lang="en-US" altLang="zh-CN" dirty="0"/>
+              <a:t>Server</a:t>
+            </a:r>
+            <a:endParaRPr kumimoji="1" lang="zh-CN" altLang="en-US" dirty="0"/>
+          </a:p>
+        </p:txBody>
+      </p:sp>
+      <p:grpSp>
+        <p:nvGrpSpPr>
+          <p:cNvPr id="11" name="组合 10">
+            <a:extLst>
+              <a:ext uri="{FF2B5EF4-FFF2-40B4-BE49-F238E27FC236}">
+                <a16:creationId xmlns:a16="http://schemas.microsoft.com/office/drawing/2014/main" id="{439A8379-6BF3-89D7-8679-09F630E321E2}"/>
+              </a:ext>
+            </a:extLst>
+          </p:cNvPr>
+          <p:cNvGrpSpPr/>
+          <p:nvPr/>
+        </p:nvGrpSpPr>
+        <p:grpSpPr>
+          <a:xfrm>
+            <a:off x="1655366" y="3252805"/>
+            <a:ext cx="4304076" cy="507601"/>
+            <a:chOff x="2396356" y="935420"/>
+            <a:chExt cx="2789228" cy="361582"/>
+          </a:xfrm>
+          <a:solidFill>
+            <a:schemeClr val="accent5"/>
+          </a:solidFill>
+        </p:grpSpPr>
+        <p:sp>
+          <p:nvSpPr>
+            <p:cNvPr id="17" name="圆角矩形 16">
+              <a:extLst>
+                <a:ext uri="{FF2B5EF4-FFF2-40B4-BE49-F238E27FC236}">
+                  <a16:creationId xmlns:a16="http://schemas.microsoft.com/office/drawing/2014/main" id="{F92E8EC4-D68B-F65F-B402-4B3D5557EF59}"/>
+                </a:ext>
+              </a:extLst>
+            </p:cNvPr>
+            <p:cNvSpPr/>
+            <p:nvPr/>
+          </p:nvSpPr>
+          <p:spPr>
+            <a:xfrm>
+              <a:off x="2396356" y="935421"/>
+              <a:ext cx="989173" cy="361581"/>
+            </a:xfrm>
+            <a:prstGeom prst="roundRect">
+              <a:avLst/>
+            </a:prstGeom>
+            <a:grpFill/>
+          </p:spPr>
+          <p:style>
+            <a:lnRef idx="2">
+              <a:schemeClr val="accent1">
+                <a:shade val="15000"/>
+              </a:schemeClr>
+            </a:lnRef>
+            <a:fillRef idx="1">
+              <a:schemeClr val="accent1"/>
+            </a:fillRef>
+            <a:effectRef idx="0">
+              <a:schemeClr val="accent1"/>
+            </a:effectRef>
+            <a:fontRef idx="minor">
+              <a:schemeClr val="lt1"/>
+            </a:fontRef>
+          </p:style>
+          <p:txBody>
+            <a:bodyPr rtlCol="0" anchor="ctr"/>
+            <a:lstStyle/>
+            <a:p>
+              <a:pPr algn="ctr"/>
+              <a:r>
+                <a:rPr kumimoji="1" lang="en-US" altLang="zh-CN"/>
+                <a:t>KvGet</a:t>
+              </a:r>
+              <a:endParaRPr kumimoji="1" lang="en-US" altLang="zh-CN" dirty="0"/>
+            </a:p>
+          </p:txBody>
+        </p:sp>
+        <p:sp>
+          <p:nvSpPr>
+            <p:cNvPr id="18" name="圆角矩形 17">
+              <a:extLst>
+                <a:ext uri="{FF2B5EF4-FFF2-40B4-BE49-F238E27FC236}">
+                  <a16:creationId xmlns:a16="http://schemas.microsoft.com/office/drawing/2014/main" id="{A810EA25-2FC2-88D6-B500-CEF6F425589B}"/>
+                </a:ext>
+              </a:extLst>
+            </p:cNvPr>
+            <p:cNvSpPr/>
+            <p:nvPr/>
+          </p:nvSpPr>
+          <p:spPr>
+            <a:xfrm>
+              <a:off x="4196411" y="935420"/>
+              <a:ext cx="989173" cy="361581"/>
+            </a:xfrm>
+            <a:prstGeom prst="roundRect">
+              <a:avLst/>
+            </a:prstGeom>
+            <a:grpFill/>
+          </p:spPr>
+          <p:style>
+            <a:lnRef idx="2">
+              <a:schemeClr val="accent1">
+                <a:shade val="15000"/>
+              </a:schemeClr>
+            </a:lnRef>
+            <a:fillRef idx="1">
+              <a:schemeClr val="accent1"/>
+            </a:fillRef>
+            <a:effectRef idx="0">
+              <a:schemeClr val="accent1"/>
+            </a:effectRef>
+            <a:fontRef idx="minor">
+              <a:schemeClr val="lt1"/>
+            </a:fontRef>
+          </p:style>
+          <p:txBody>
+            <a:bodyPr rtlCol="0" anchor="ctr"/>
+            <a:lstStyle/>
+            <a:p>
+              <a:pPr algn="ctr"/>
+              <a:r>
+                <a:rPr kumimoji="1" lang="en-US" altLang="zh-CN"/>
+                <a:t>KvScan</a:t>
+              </a:r>
+              <a:endParaRPr kumimoji="1" lang="en-US" altLang="zh-CN" dirty="0"/>
+            </a:p>
+          </p:txBody>
+        </p:sp>
+      </p:grpSp>
+      <p:grpSp>
+        <p:nvGrpSpPr>
+          <p:cNvPr id="12" name="组合 11">
+            <a:extLst>
+              <a:ext uri="{FF2B5EF4-FFF2-40B4-BE49-F238E27FC236}">
+                <a16:creationId xmlns:a16="http://schemas.microsoft.com/office/drawing/2014/main" id="{8AABFB22-81E9-2C85-FDBC-595405AACFF4}"/>
+              </a:ext>
+            </a:extLst>
+          </p:cNvPr>
+          <p:cNvGrpSpPr/>
+          <p:nvPr/>
+        </p:nvGrpSpPr>
+        <p:grpSpPr>
+          <a:xfrm>
+            <a:off x="7210721" y="3252805"/>
+            <a:ext cx="4168918" cy="507600"/>
+            <a:chOff x="5996467" y="935420"/>
+            <a:chExt cx="2701640" cy="361581"/>
+          </a:xfrm>
+          <a:solidFill>
+            <a:schemeClr val="accent5"/>
+          </a:solidFill>
+        </p:grpSpPr>
+        <p:sp>
+          <p:nvSpPr>
+            <p:cNvPr id="15" name="圆角矩形 14">
+              <a:extLst>
+                <a:ext uri="{FF2B5EF4-FFF2-40B4-BE49-F238E27FC236}">
+                  <a16:creationId xmlns:a16="http://schemas.microsoft.com/office/drawing/2014/main" id="{6ACCB461-5D1C-212A-ABDE-2585E634F120}"/>
+                </a:ext>
+              </a:extLst>
+            </p:cNvPr>
+            <p:cNvSpPr/>
+            <p:nvPr/>
+          </p:nvSpPr>
+          <p:spPr>
+            <a:xfrm>
+              <a:off x="5996467" y="935420"/>
+              <a:ext cx="989173" cy="361581"/>
+            </a:xfrm>
+            <a:prstGeom prst="roundRect">
+              <a:avLst/>
+            </a:prstGeom>
+            <a:grpFill/>
+          </p:spPr>
+          <p:style>
+            <a:lnRef idx="2">
+              <a:schemeClr val="accent1">
+                <a:shade val="15000"/>
+              </a:schemeClr>
+            </a:lnRef>
+            <a:fillRef idx="1">
+              <a:schemeClr val="accent1"/>
+            </a:fillRef>
+            <a:effectRef idx="0">
+              <a:schemeClr val="accent1"/>
+            </a:effectRef>
+            <a:fontRef idx="minor">
+              <a:schemeClr val="lt1"/>
+            </a:fontRef>
+          </p:style>
+          <p:txBody>
+            <a:bodyPr rtlCol="0" anchor="ctr"/>
+            <a:lstStyle/>
+            <a:p>
+              <a:pPr algn="ctr"/>
+              <a:r>
+                <a:rPr kumimoji="1" lang="en-US" altLang="zh-CN" dirty="0" err="1"/>
+                <a:t>KvPreWrite</a:t>
+              </a:r>
+              <a:endParaRPr kumimoji="1" lang="en-US" altLang="zh-CN" dirty="0"/>
+            </a:p>
+          </p:txBody>
+        </p:sp>
+        <p:sp>
+          <p:nvSpPr>
+            <p:cNvPr id="16" name="圆角矩形 15">
+              <a:extLst>
+                <a:ext uri="{FF2B5EF4-FFF2-40B4-BE49-F238E27FC236}">
+                  <a16:creationId xmlns:a16="http://schemas.microsoft.com/office/drawing/2014/main" id="{64A089EB-070F-4AE8-7677-D3BAFCCD02CF}"/>
+                </a:ext>
+              </a:extLst>
+            </p:cNvPr>
+            <p:cNvSpPr/>
+            <p:nvPr/>
+          </p:nvSpPr>
+          <p:spPr>
+            <a:xfrm>
+              <a:off x="7708934" y="935420"/>
+              <a:ext cx="989173" cy="361581"/>
+            </a:xfrm>
+            <a:prstGeom prst="roundRect">
+              <a:avLst/>
+            </a:prstGeom>
+            <a:grpFill/>
+          </p:spPr>
+          <p:style>
+            <a:lnRef idx="2">
+              <a:schemeClr val="accent1">
+                <a:shade val="15000"/>
+              </a:schemeClr>
+            </a:lnRef>
+            <a:fillRef idx="1">
+              <a:schemeClr val="accent1"/>
+            </a:fillRef>
+            <a:effectRef idx="0">
+              <a:schemeClr val="accent1"/>
+            </a:effectRef>
+            <a:fontRef idx="minor">
+              <a:schemeClr val="lt1"/>
+            </a:fontRef>
+          </p:style>
+          <p:txBody>
+            <a:bodyPr rtlCol="0" anchor="ctr"/>
+            <a:lstStyle/>
+            <a:p>
+              <a:pPr algn="ctr"/>
+              <a:r>
+                <a:rPr kumimoji="1" lang="en-US" altLang="zh-CN" sz="1400" dirty="0" err="1"/>
+                <a:t>KvCommit</a:t>
+              </a:r>
+              <a:r>
+                <a:rPr kumimoji="1" lang="en-US" altLang="zh-CN" sz="1400" dirty="0"/>
+                <a:t>/</a:t>
+              </a:r>
+            </a:p>
+            <a:p>
+              <a:pPr algn="ctr"/>
+              <a:r>
+                <a:rPr kumimoji="1" lang="en-US" altLang="zh-CN" sz="1400" dirty="0" err="1"/>
+                <a:t>KvBatchRollback</a:t>
+              </a:r>
+              <a:endParaRPr kumimoji="1" lang="en-US" altLang="zh-CN" sz="1400" dirty="0"/>
+            </a:p>
+          </p:txBody>
+        </p:sp>
+      </p:grpSp>
+      <p:sp>
+        <p:nvSpPr>
+          <p:cNvPr id="13" name="圆角矩形 12">
+            <a:extLst>
+              <a:ext uri="{FF2B5EF4-FFF2-40B4-BE49-F238E27FC236}">
+                <a16:creationId xmlns:a16="http://schemas.microsoft.com/office/drawing/2014/main" id="{81188AF6-180D-7C78-8469-4633CE598559}"/>
+              </a:ext>
+            </a:extLst>
+          </p:cNvPr>
+          <p:cNvSpPr/>
+          <p:nvPr/>
+        </p:nvSpPr>
+        <p:spPr>
+          <a:xfrm>
+            <a:off x="3154982" y="5294474"/>
+            <a:ext cx="1353601" cy="507600"/>
+          </a:xfrm>
+          <a:prstGeom prst="roundRect">
+            <a:avLst/>
+          </a:prstGeom>
+          <a:solidFill>
+            <a:schemeClr val="accent5"/>
+          </a:solidFill>
+        </p:spPr>
+        <p:style>
+          <a:lnRef idx="2">
+            <a:schemeClr val="accent1">
+              <a:shade val="15000"/>
+            </a:schemeClr>
+          </a:lnRef>
+          <a:fillRef idx="1">
+            <a:schemeClr val="accent1"/>
+          </a:fillRef>
+          <a:effectRef idx="0">
+            <a:schemeClr val="accent1"/>
+          </a:effectRef>
+          <a:fontRef idx="minor">
+            <a:schemeClr val="lt1"/>
+          </a:fontRef>
+        </p:style>
+        <p:txBody>
+          <a:bodyPr rtlCol="0" anchor="ctr"/>
+          <a:lstStyle/>
+          <a:p>
+            <a:pPr algn="ctr"/>
+            <a:r>
+              <a:rPr kumimoji="1" lang="en-US" altLang="zh-CN" dirty="0"/>
+              <a:t>Reader</a:t>
+            </a:r>
+          </a:p>
+        </p:txBody>
+      </p:sp>
+      <p:sp>
+        <p:nvSpPr>
+          <p:cNvPr id="14" name="圆角矩形 13">
+            <a:extLst>
+              <a:ext uri="{FF2B5EF4-FFF2-40B4-BE49-F238E27FC236}">
+                <a16:creationId xmlns:a16="http://schemas.microsoft.com/office/drawing/2014/main" id="{D727266A-58DA-1ADD-1261-6C6D3A05C701}"/>
+              </a:ext>
+            </a:extLst>
+          </p:cNvPr>
+          <p:cNvSpPr/>
+          <p:nvPr/>
+        </p:nvSpPr>
+        <p:spPr>
+          <a:xfrm>
+            <a:off x="8685398" y="5294474"/>
+            <a:ext cx="1353601" cy="507600"/>
+          </a:xfrm>
+          <a:prstGeom prst="roundRect">
+            <a:avLst/>
+          </a:prstGeom>
+          <a:solidFill>
+            <a:schemeClr val="accent5"/>
+          </a:solidFill>
+        </p:spPr>
+        <p:style>
+          <a:lnRef idx="2">
+            <a:schemeClr val="accent1">
+              <a:shade val="15000"/>
+            </a:schemeClr>
+          </a:lnRef>
+          <a:fillRef idx="1">
+            <a:schemeClr val="accent1"/>
+          </a:fillRef>
+          <a:effectRef idx="0">
+            <a:schemeClr val="accent1"/>
+          </a:effectRef>
+          <a:fontRef idx="minor">
+            <a:schemeClr val="lt1"/>
+          </a:fontRef>
+        </p:style>
+        <p:txBody>
+          <a:bodyPr rtlCol="0" anchor="ctr"/>
+          <a:lstStyle/>
+          <a:p>
+            <a:pPr algn="ctr"/>
+            <a:r>
+              <a:rPr kumimoji="1" lang="en-US" altLang="zh-CN" dirty="0"/>
+              <a:t>Write</a:t>
+            </a:r>
+          </a:p>
+        </p:txBody>
+      </p:sp>
+      <p:sp>
+        <p:nvSpPr>
+          <p:cNvPr id="19" name="圆角矩形 18">
+            <a:extLst>
+              <a:ext uri="{FF2B5EF4-FFF2-40B4-BE49-F238E27FC236}">
+                <a16:creationId xmlns:a16="http://schemas.microsoft.com/office/drawing/2014/main" id="{31AE6348-4630-F790-BF91-2863411886A8}"/>
+              </a:ext>
+            </a:extLst>
+          </p:cNvPr>
+          <p:cNvSpPr/>
+          <p:nvPr/>
+        </p:nvSpPr>
+        <p:spPr>
+          <a:xfrm>
+            <a:off x="1085088" y="5294474"/>
+            <a:ext cx="10752685" cy="985233"/>
+          </a:xfrm>
+          <a:prstGeom prst="roundRect">
+            <a:avLst>
+              <a:gd name="adj" fmla="val 2752"/>
+            </a:avLst>
+          </a:prstGeom>
+          <a:noFill/>
+        </p:spPr>
+        <p:style>
+          <a:lnRef idx="2">
+            <a:schemeClr val="accent1">
+              <a:shade val="15000"/>
+            </a:schemeClr>
+          </a:lnRef>
+          <a:fillRef idx="1">
+            <a:schemeClr val="accent1"/>
+          </a:fillRef>
+          <a:effectRef idx="0">
+            <a:schemeClr val="accent1"/>
+          </a:effectRef>
+          <a:fontRef idx="minor">
+            <a:schemeClr val="lt1"/>
+          </a:fontRef>
+        </p:style>
+        <p:txBody>
+          <a:bodyPr rtlCol="0" anchor="ctr"/>
+          <a:lstStyle/>
+          <a:p>
+            <a:pPr algn="ctr"/>
+            <a:endParaRPr kumimoji="1" lang="zh-CN" altLang="en-US"/>
+          </a:p>
+        </p:txBody>
+      </p:sp>
+      <p:sp>
+        <p:nvSpPr>
+          <p:cNvPr id="20" name="文本框 19">
+            <a:extLst>
+              <a:ext uri="{FF2B5EF4-FFF2-40B4-BE49-F238E27FC236}">
+                <a16:creationId xmlns:a16="http://schemas.microsoft.com/office/drawing/2014/main" id="{B89B6763-B366-482B-958C-2326B3C908A2}"/>
+              </a:ext>
+            </a:extLst>
+          </p:cNvPr>
+          <p:cNvSpPr txBox="1"/>
+          <p:nvPr/>
+        </p:nvSpPr>
+        <p:spPr>
+          <a:xfrm>
+            <a:off x="1085088" y="5910375"/>
+            <a:ext cx="1345240" cy="369332"/>
+          </a:xfrm>
+          <a:prstGeom prst="rect">
+            <a:avLst/>
+          </a:prstGeom>
+          <a:noFill/>
+        </p:spPr>
+        <p:txBody>
+          <a:bodyPr wrap="none" rtlCol="0">
+            <a:spAutoFit/>
+          </a:bodyPr>
+          <a:lstStyle/>
+          <a:p>
+            <a:r>
+              <a:rPr kumimoji="1" lang="en-US" altLang="zh-CN" dirty="0" err="1"/>
+              <a:t>RaftStorage</a:t>
+            </a:r>
+            <a:endParaRPr kumimoji="1" lang="zh-CN" altLang="en-US" dirty="0"/>
+          </a:p>
+        </p:txBody>
+      </p:sp>
+      <p:sp>
+        <p:nvSpPr>
+          <p:cNvPr id="22" name="圆角矩形 21">
+            <a:extLst>
+              <a:ext uri="{FF2B5EF4-FFF2-40B4-BE49-F238E27FC236}">
+                <a16:creationId xmlns:a16="http://schemas.microsoft.com/office/drawing/2014/main" id="{675238B5-10B6-AC7E-5AF3-C45C8895B582}"/>
+              </a:ext>
+            </a:extLst>
+          </p:cNvPr>
+          <p:cNvSpPr/>
+          <p:nvPr/>
+        </p:nvSpPr>
+        <p:spPr>
+          <a:xfrm>
+            <a:off x="1496707" y="4301327"/>
+            <a:ext cx="1526399" cy="507600"/>
+          </a:xfrm>
+          <a:prstGeom prst="roundRect">
+            <a:avLst/>
+          </a:prstGeom>
+          <a:solidFill>
+            <a:schemeClr val="accent2"/>
+          </a:solidFill>
+        </p:spPr>
+        <p:style>
+          <a:lnRef idx="2">
+            <a:schemeClr val="accent1">
+              <a:shade val="15000"/>
+            </a:schemeClr>
+          </a:lnRef>
+          <a:fillRef idx="1">
+            <a:schemeClr val="accent1"/>
+          </a:fillRef>
+          <a:effectRef idx="0">
+            <a:schemeClr val="accent1"/>
+          </a:effectRef>
+          <a:fontRef idx="minor">
+            <a:schemeClr val="lt1"/>
+          </a:fontRef>
+        </p:style>
+        <p:txBody>
+          <a:bodyPr rtlCol="0" anchor="ctr"/>
+          <a:lstStyle/>
+          <a:p>
+            <a:pPr algn="ctr"/>
+            <a:r>
+              <a:rPr kumimoji="1" lang="en-US" altLang="zh-CN" dirty="0" err="1"/>
+              <a:t>GetValue</a:t>
+            </a:r>
+            <a:endParaRPr kumimoji="1" lang="en-US" altLang="zh-CN" dirty="0"/>
+          </a:p>
+        </p:txBody>
+      </p:sp>
+      <p:sp>
+        <p:nvSpPr>
+          <p:cNvPr id="23" name="圆角矩形 22">
+            <a:extLst>
+              <a:ext uri="{FF2B5EF4-FFF2-40B4-BE49-F238E27FC236}">
+                <a16:creationId xmlns:a16="http://schemas.microsoft.com/office/drawing/2014/main" id="{602327D6-6D46-9104-2037-19332348447A}"/>
+              </a:ext>
+            </a:extLst>
+          </p:cNvPr>
+          <p:cNvSpPr/>
+          <p:nvPr/>
+        </p:nvSpPr>
+        <p:spPr>
+          <a:xfrm>
+            <a:off x="4635953" y="4301326"/>
+            <a:ext cx="1580768" cy="507600"/>
+          </a:xfrm>
+          <a:prstGeom prst="roundRect">
+            <a:avLst/>
+          </a:prstGeom>
+          <a:solidFill>
+            <a:schemeClr val="accent2"/>
+          </a:solidFill>
+        </p:spPr>
+        <p:style>
+          <a:lnRef idx="2">
+            <a:schemeClr val="accent1">
+              <a:shade val="15000"/>
+            </a:schemeClr>
+          </a:lnRef>
+          <a:fillRef idx="1">
+            <a:schemeClr val="accent1"/>
+          </a:fillRef>
+          <a:effectRef idx="0">
+            <a:schemeClr val="accent1"/>
+          </a:effectRef>
+          <a:fontRef idx="minor">
+            <a:schemeClr val="lt1"/>
+          </a:fontRef>
+        </p:style>
+        <p:txBody>
+          <a:bodyPr rtlCol="0" anchor="ctr"/>
+          <a:lstStyle/>
+          <a:p>
+            <a:pPr algn="ctr"/>
+            <a:r>
+              <a:rPr kumimoji="1" lang="en-US" altLang="zh-CN" sz="1400" dirty="0" err="1"/>
+              <a:t>CurrentWrite</a:t>
+            </a:r>
+            <a:r>
+              <a:rPr kumimoji="1" lang="en-US" altLang="zh-CN" sz="1400" dirty="0"/>
+              <a:t>/</a:t>
+            </a:r>
+          </a:p>
+          <a:p>
+            <a:pPr algn="ctr"/>
+            <a:r>
+              <a:rPr kumimoji="1" lang="en-US" altLang="zh-CN" sz="1400" dirty="0" err="1"/>
+              <a:t>MostRecentWrite</a:t>
+            </a:r>
+            <a:endParaRPr kumimoji="1" lang="en-US" altLang="zh-CN" sz="1400" dirty="0"/>
+          </a:p>
+        </p:txBody>
+      </p:sp>
+      <p:sp>
+        <p:nvSpPr>
+          <p:cNvPr id="25" name="圆角矩形 24">
+            <a:extLst>
+              <a:ext uri="{FF2B5EF4-FFF2-40B4-BE49-F238E27FC236}">
+                <a16:creationId xmlns:a16="http://schemas.microsoft.com/office/drawing/2014/main" id="{1C60EDED-0F74-6732-558C-8C7DC34EE8E3}"/>
+              </a:ext>
+            </a:extLst>
+          </p:cNvPr>
+          <p:cNvSpPr/>
+          <p:nvPr/>
+        </p:nvSpPr>
+        <p:spPr>
+          <a:xfrm>
+            <a:off x="10168200" y="4301326"/>
+            <a:ext cx="1526399" cy="507600"/>
+          </a:xfrm>
+          <a:prstGeom prst="roundRect">
+            <a:avLst/>
+          </a:prstGeom>
+          <a:solidFill>
+            <a:schemeClr val="accent2"/>
+          </a:solidFill>
+        </p:spPr>
+        <p:style>
+          <a:lnRef idx="2">
+            <a:schemeClr val="accent1">
+              <a:shade val="15000"/>
+            </a:schemeClr>
+          </a:lnRef>
+          <a:fillRef idx="1">
+            <a:schemeClr val="accent1"/>
+          </a:fillRef>
+          <a:effectRef idx="0">
+            <a:schemeClr val="accent1"/>
+          </a:effectRef>
+          <a:fontRef idx="minor">
+            <a:schemeClr val="lt1"/>
+          </a:fontRef>
+        </p:style>
+        <p:txBody>
+          <a:bodyPr rtlCol="0" anchor="ctr"/>
+          <a:lstStyle/>
+          <a:p>
+            <a:pPr algn="ctr"/>
+            <a:r>
+              <a:rPr kumimoji="1" lang="en-US" altLang="zh-CN" dirty="0" err="1"/>
+              <a:t>PutWrite</a:t>
+            </a:r>
+            <a:endParaRPr kumimoji="1" lang="en-US" altLang="zh-CN" dirty="0"/>
+          </a:p>
+        </p:txBody>
+      </p:sp>
+      <p:sp>
+        <p:nvSpPr>
+          <p:cNvPr id="26" name="圆角矩形 25">
+            <a:extLst>
+              <a:ext uri="{FF2B5EF4-FFF2-40B4-BE49-F238E27FC236}">
+                <a16:creationId xmlns:a16="http://schemas.microsoft.com/office/drawing/2014/main" id="{CFF2D297-54FB-E5DC-89FA-C39728E88C21}"/>
+              </a:ext>
+            </a:extLst>
+          </p:cNvPr>
+          <p:cNvSpPr/>
+          <p:nvPr/>
+        </p:nvSpPr>
+        <p:spPr>
+          <a:xfrm>
+            <a:off x="7031908" y="4301326"/>
+            <a:ext cx="1526399" cy="507600"/>
+          </a:xfrm>
+          <a:prstGeom prst="roundRect">
+            <a:avLst/>
+          </a:prstGeom>
+          <a:solidFill>
+            <a:schemeClr val="accent2"/>
+          </a:solidFill>
+        </p:spPr>
+        <p:style>
+          <a:lnRef idx="2">
+            <a:schemeClr val="accent1">
+              <a:shade val="15000"/>
+            </a:schemeClr>
+          </a:lnRef>
+          <a:fillRef idx="1">
+            <a:schemeClr val="accent1"/>
+          </a:fillRef>
+          <a:effectRef idx="0">
+            <a:schemeClr val="accent1"/>
+          </a:effectRef>
+          <a:fontRef idx="minor">
+            <a:schemeClr val="lt1"/>
+          </a:fontRef>
+        </p:style>
+        <p:txBody>
+          <a:bodyPr rtlCol="0" anchor="ctr"/>
+          <a:lstStyle/>
+          <a:p>
+            <a:pPr algn="ctr"/>
+            <a:r>
+              <a:rPr kumimoji="1" lang="en-US" altLang="zh-CN" dirty="0" err="1"/>
+              <a:t>PutValue</a:t>
+            </a:r>
+            <a:r>
+              <a:rPr kumimoji="1" lang="en-US" altLang="zh-CN" dirty="0"/>
+              <a:t>/</a:t>
+            </a:r>
+          </a:p>
+          <a:p>
+            <a:pPr algn="ctr"/>
+            <a:r>
+              <a:rPr kumimoji="1" lang="en-US" altLang="zh-CN" dirty="0" err="1"/>
+              <a:t>DeleteValue</a:t>
+            </a:r>
+            <a:endParaRPr kumimoji="1" lang="en-US" altLang="zh-CN" dirty="0"/>
+          </a:p>
+        </p:txBody>
+      </p:sp>
+      <p:sp>
+        <p:nvSpPr>
+          <p:cNvPr id="27" name="圆角矩形 26">
+            <a:extLst>
+              <a:ext uri="{FF2B5EF4-FFF2-40B4-BE49-F238E27FC236}">
+                <a16:creationId xmlns:a16="http://schemas.microsoft.com/office/drawing/2014/main" id="{01C4C754-D7E2-5A06-7613-4F7AF394F4C7}"/>
+              </a:ext>
+            </a:extLst>
+          </p:cNvPr>
+          <p:cNvSpPr/>
+          <p:nvPr/>
+        </p:nvSpPr>
+        <p:spPr>
+          <a:xfrm>
+            <a:off x="8600054" y="4301326"/>
+            <a:ext cx="1526399" cy="507600"/>
+          </a:xfrm>
+          <a:prstGeom prst="roundRect">
+            <a:avLst/>
+          </a:prstGeom>
+          <a:solidFill>
+            <a:schemeClr val="accent2"/>
+          </a:solidFill>
+        </p:spPr>
+        <p:style>
+          <a:lnRef idx="2">
+            <a:schemeClr val="accent1">
+              <a:shade val="15000"/>
+            </a:schemeClr>
+          </a:lnRef>
+          <a:fillRef idx="1">
+            <a:schemeClr val="accent1"/>
+          </a:fillRef>
+          <a:effectRef idx="0">
+            <a:schemeClr val="accent1"/>
+          </a:effectRef>
+          <a:fontRef idx="minor">
+            <a:schemeClr val="lt1"/>
+          </a:fontRef>
+        </p:style>
+        <p:txBody>
+          <a:bodyPr rtlCol="0" anchor="ctr"/>
+          <a:lstStyle/>
+          <a:p>
+            <a:pPr algn="ctr"/>
+            <a:r>
+              <a:rPr kumimoji="1" lang="en-US" altLang="zh-CN" dirty="0" err="1"/>
+              <a:t>PutLock</a:t>
+            </a:r>
+            <a:r>
+              <a:rPr kumimoji="1" lang="en-US" altLang="zh-CN" dirty="0"/>
+              <a:t>/</a:t>
+            </a:r>
+          </a:p>
+          <a:p>
+            <a:pPr algn="ctr"/>
+            <a:r>
+              <a:rPr kumimoji="1" lang="en-US" altLang="zh-CN" dirty="0" err="1"/>
+              <a:t>DeleteLock</a:t>
+            </a:r>
+            <a:endParaRPr kumimoji="1" lang="en-US" altLang="zh-CN" dirty="0"/>
+          </a:p>
+        </p:txBody>
+      </p:sp>
+      <p:sp>
+        <p:nvSpPr>
+          <p:cNvPr id="28" name="圆角矩形 27">
+            <a:extLst>
+              <a:ext uri="{FF2B5EF4-FFF2-40B4-BE49-F238E27FC236}">
+                <a16:creationId xmlns:a16="http://schemas.microsoft.com/office/drawing/2014/main" id="{16D541B6-1A1A-C71D-70BE-1353BD0DEDCE}"/>
+              </a:ext>
+            </a:extLst>
+          </p:cNvPr>
+          <p:cNvSpPr/>
+          <p:nvPr/>
+        </p:nvSpPr>
+        <p:spPr>
+          <a:xfrm>
+            <a:off x="3066330" y="4301326"/>
+            <a:ext cx="1526399" cy="507600"/>
+          </a:xfrm>
+          <a:prstGeom prst="roundRect">
+            <a:avLst/>
+          </a:prstGeom>
+          <a:solidFill>
+            <a:schemeClr val="accent2"/>
+          </a:solidFill>
+        </p:spPr>
+        <p:style>
+          <a:lnRef idx="2">
+            <a:schemeClr val="accent1">
+              <a:shade val="15000"/>
+            </a:schemeClr>
+          </a:lnRef>
+          <a:fillRef idx="1">
+            <a:schemeClr val="accent1"/>
+          </a:fillRef>
+          <a:effectRef idx="0">
+            <a:schemeClr val="accent1"/>
+          </a:effectRef>
+          <a:fontRef idx="minor">
+            <a:schemeClr val="lt1"/>
+          </a:fontRef>
+        </p:style>
+        <p:txBody>
+          <a:bodyPr rtlCol="0" anchor="ctr"/>
+          <a:lstStyle/>
+          <a:p>
+            <a:pPr algn="ctr"/>
+            <a:r>
+              <a:rPr kumimoji="1" lang="en-US" altLang="zh-CN" dirty="0" err="1"/>
+              <a:t>GetLock</a:t>
+            </a:r>
+            <a:endParaRPr kumimoji="1" lang="en-US" altLang="zh-CN" dirty="0"/>
+          </a:p>
+        </p:txBody>
+      </p:sp>
+      <p:sp>
+        <p:nvSpPr>
+          <p:cNvPr id="29" name="圆角矩形 28">
+            <a:extLst>
+              <a:ext uri="{FF2B5EF4-FFF2-40B4-BE49-F238E27FC236}">
+                <a16:creationId xmlns:a16="http://schemas.microsoft.com/office/drawing/2014/main" id="{3FE0CEC8-3CF8-1C17-7952-2F3BAFD466C5}"/>
+              </a:ext>
+            </a:extLst>
+          </p:cNvPr>
+          <p:cNvSpPr/>
+          <p:nvPr/>
+        </p:nvSpPr>
+        <p:spPr>
+          <a:xfrm>
+            <a:off x="1085088" y="3984334"/>
+            <a:ext cx="10752685" cy="832507"/>
+          </a:xfrm>
+          <a:prstGeom prst="roundRect">
+            <a:avLst>
+              <a:gd name="adj" fmla="val 2752"/>
+            </a:avLst>
+          </a:prstGeom>
+          <a:noFill/>
+        </p:spPr>
+        <p:style>
+          <a:lnRef idx="2">
+            <a:schemeClr val="accent1">
+              <a:shade val="15000"/>
+            </a:schemeClr>
+          </a:lnRef>
+          <a:fillRef idx="1">
+            <a:schemeClr val="accent1"/>
+          </a:fillRef>
+          <a:effectRef idx="0">
+            <a:schemeClr val="accent1"/>
+          </a:effectRef>
+          <a:fontRef idx="minor">
+            <a:schemeClr val="lt1"/>
+          </a:fontRef>
+        </p:style>
+        <p:txBody>
+          <a:bodyPr rtlCol="0" anchor="ctr"/>
+          <a:lstStyle/>
+          <a:p>
+            <a:pPr algn="ctr"/>
+            <a:endParaRPr kumimoji="1" lang="zh-CN" altLang="en-US"/>
+          </a:p>
+        </p:txBody>
+      </p:sp>
+      <p:sp>
+        <p:nvSpPr>
+          <p:cNvPr id="31" name="文本框 30">
+            <a:extLst>
+              <a:ext uri="{FF2B5EF4-FFF2-40B4-BE49-F238E27FC236}">
+                <a16:creationId xmlns:a16="http://schemas.microsoft.com/office/drawing/2014/main" id="{DBFF4AC6-2919-B6D0-459C-0E45AF35C495}"/>
+              </a:ext>
+            </a:extLst>
+          </p:cNvPr>
+          <p:cNvSpPr txBox="1"/>
+          <p:nvPr/>
+        </p:nvSpPr>
+        <p:spPr>
+          <a:xfrm>
+            <a:off x="1085088" y="3984333"/>
+            <a:ext cx="811441" cy="369332"/>
+          </a:xfrm>
+          <a:prstGeom prst="rect">
+            <a:avLst/>
+          </a:prstGeom>
+          <a:noFill/>
+        </p:spPr>
+        <p:txBody>
+          <a:bodyPr wrap="none" rtlCol="0">
+            <a:spAutoFit/>
+          </a:bodyPr>
+          <a:lstStyle/>
+          <a:p>
+            <a:r>
+              <a:rPr kumimoji="1" lang="en-US" altLang="zh-CN" dirty="0"/>
+              <a:t>MVCC</a:t>
+            </a:r>
+            <a:endParaRPr kumimoji="1" lang="zh-CN" altLang="en-US" dirty="0"/>
+          </a:p>
+        </p:txBody>
+      </p:sp>
+      <p:cxnSp>
+        <p:nvCxnSpPr>
+          <p:cNvPr id="33" name="肘形连接符 32">
+            <a:extLst>
+              <a:ext uri="{FF2B5EF4-FFF2-40B4-BE49-F238E27FC236}">
+                <a16:creationId xmlns:a16="http://schemas.microsoft.com/office/drawing/2014/main" id="{35F990EF-86E3-2AE7-6830-1498A88A4705}"/>
+              </a:ext>
+            </a:extLst>
+          </p:cNvPr>
+          <p:cNvCxnSpPr>
+            <a:cxnSpLocks/>
+            <a:stCxn id="22" idx="2"/>
+            <a:endCxn id="13" idx="0"/>
+          </p:cNvCxnSpPr>
+          <p:nvPr/>
+        </p:nvCxnSpPr>
+        <p:spPr>
+          <a:xfrm rot="16200000" flipH="1">
+            <a:off x="2803072" y="4265762"/>
+            <a:ext cx="485547" cy="1571876"/>
+          </a:xfrm>
+          <a:prstGeom prst="bentConnector3">
+            <a:avLst/>
+          </a:prstGeom>
+          <a:ln w="19050">
+            <a:solidFill>
+              <a:schemeClr val="tx1"/>
+            </a:solidFill>
+            <a:tailEnd type="triangle"/>
+          </a:ln>
+        </p:spPr>
+        <p:style>
+          <a:lnRef idx="1">
+            <a:schemeClr val="accent1"/>
+          </a:lnRef>
+          <a:fillRef idx="0">
+            <a:schemeClr val="accent1"/>
+          </a:fillRef>
+          <a:effectRef idx="0">
+            <a:schemeClr val="accent1"/>
+          </a:effectRef>
+          <a:fontRef idx="minor">
+            <a:schemeClr val="tx1"/>
+          </a:fontRef>
+        </p:style>
+      </p:cxnSp>
+      <p:cxnSp>
+        <p:nvCxnSpPr>
+          <p:cNvPr id="35" name="肘形连接符 34">
+            <a:extLst>
+              <a:ext uri="{FF2B5EF4-FFF2-40B4-BE49-F238E27FC236}">
+                <a16:creationId xmlns:a16="http://schemas.microsoft.com/office/drawing/2014/main" id="{A2E74166-5D5D-6565-B6E3-B47CC6A0F26C}"/>
+              </a:ext>
+            </a:extLst>
+          </p:cNvPr>
+          <p:cNvCxnSpPr>
+            <a:cxnSpLocks/>
+            <a:stCxn id="28" idx="2"/>
+            <a:endCxn id="13" idx="0"/>
+          </p:cNvCxnSpPr>
+          <p:nvPr/>
+        </p:nvCxnSpPr>
+        <p:spPr>
+          <a:xfrm rot="16200000" flipH="1">
+            <a:off x="3587882" y="5050573"/>
+            <a:ext cx="485548" cy="2253"/>
+          </a:xfrm>
+          <a:prstGeom prst="bentConnector3">
+            <a:avLst/>
+          </a:prstGeom>
+          <a:ln w="19050">
+            <a:solidFill>
+              <a:schemeClr val="tx1"/>
+            </a:solidFill>
+            <a:tailEnd type="triangle"/>
+          </a:ln>
+        </p:spPr>
+        <p:style>
+          <a:lnRef idx="1">
+            <a:schemeClr val="accent1"/>
+          </a:lnRef>
+          <a:fillRef idx="0">
+            <a:schemeClr val="accent1"/>
+          </a:fillRef>
+          <a:effectRef idx="0">
+            <a:schemeClr val="accent1"/>
+          </a:effectRef>
+          <a:fontRef idx="minor">
+            <a:schemeClr val="tx1"/>
+          </a:fontRef>
+        </p:style>
+      </p:cxnSp>
+      <p:cxnSp>
+        <p:nvCxnSpPr>
+          <p:cNvPr id="38" name="肘形连接符 37">
+            <a:extLst>
+              <a:ext uri="{FF2B5EF4-FFF2-40B4-BE49-F238E27FC236}">
+                <a16:creationId xmlns:a16="http://schemas.microsoft.com/office/drawing/2014/main" id="{3A4BA7C6-76CA-1F21-B7E2-EF59006BF59E}"/>
+              </a:ext>
+            </a:extLst>
+          </p:cNvPr>
+          <p:cNvCxnSpPr>
+            <a:cxnSpLocks/>
+            <a:stCxn id="23" idx="2"/>
+            <a:endCxn id="13" idx="0"/>
+          </p:cNvCxnSpPr>
+          <p:nvPr/>
+        </p:nvCxnSpPr>
+        <p:spPr>
+          <a:xfrm rot="5400000">
+            <a:off x="4386286" y="4254423"/>
+            <a:ext cx="485548" cy="1594554"/>
+          </a:xfrm>
+          <a:prstGeom prst="bentConnector3">
+            <a:avLst>
+              <a:gd name="adj1" fmla="val 50000"/>
+            </a:avLst>
+          </a:prstGeom>
+          <a:ln w="19050">
+            <a:solidFill>
+              <a:schemeClr val="tx1"/>
+            </a:solidFill>
+            <a:tailEnd type="triangle"/>
+          </a:ln>
+        </p:spPr>
+        <p:style>
+          <a:lnRef idx="1">
+            <a:schemeClr val="accent1"/>
+          </a:lnRef>
+          <a:fillRef idx="0">
+            <a:schemeClr val="accent1"/>
+          </a:fillRef>
+          <a:effectRef idx="0">
+            <a:schemeClr val="accent1"/>
+          </a:effectRef>
+          <a:fontRef idx="minor">
+            <a:schemeClr val="tx1"/>
+          </a:fontRef>
+        </p:style>
+      </p:cxnSp>
+      <p:cxnSp>
+        <p:nvCxnSpPr>
+          <p:cNvPr id="41" name="肘形连接符 40">
+            <a:extLst>
+              <a:ext uri="{FF2B5EF4-FFF2-40B4-BE49-F238E27FC236}">
+                <a16:creationId xmlns:a16="http://schemas.microsoft.com/office/drawing/2014/main" id="{8ED28D1E-4814-EE78-D7B2-9BF42C4B83F4}"/>
+              </a:ext>
+            </a:extLst>
+          </p:cNvPr>
+          <p:cNvCxnSpPr>
+            <a:cxnSpLocks/>
+            <a:stCxn id="26" idx="2"/>
+            <a:endCxn id="14" idx="0"/>
+          </p:cNvCxnSpPr>
+          <p:nvPr/>
+        </p:nvCxnSpPr>
+        <p:spPr>
+          <a:xfrm rot="16200000" flipH="1">
+            <a:off x="8335879" y="4268154"/>
+            <a:ext cx="485548" cy="1567091"/>
+          </a:xfrm>
+          <a:prstGeom prst="bentConnector3">
+            <a:avLst>
+              <a:gd name="adj1" fmla="val 50000"/>
+            </a:avLst>
+          </a:prstGeom>
+          <a:ln w="19050">
+            <a:solidFill>
+              <a:schemeClr val="tx1"/>
+            </a:solidFill>
+            <a:tailEnd type="triangle"/>
+          </a:ln>
+        </p:spPr>
+        <p:style>
+          <a:lnRef idx="1">
+            <a:schemeClr val="accent1"/>
+          </a:lnRef>
+          <a:fillRef idx="0">
+            <a:schemeClr val="accent1"/>
+          </a:fillRef>
+          <a:effectRef idx="0">
+            <a:schemeClr val="accent1"/>
+          </a:effectRef>
+          <a:fontRef idx="minor">
+            <a:schemeClr val="tx1"/>
+          </a:fontRef>
+        </p:style>
+      </p:cxnSp>
+      <p:cxnSp>
+        <p:nvCxnSpPr>
+          <p:cNvPr id="44" name="肘形连接符 43">
+            <a:extLst>
+              <a:ext uri="{FF2B5EF4-FFF2-40B4-BE49-F238E27FC236}">
+                <a16:creationId xmlns:a16="http://schemas.microsoft.com/office/drawing/2014/main" id="{E40EDDE2-FCF9-3CE0-7DE8-79559CEC4AC4}"/>
+              </a:ext>
+            </a:extLst>
+          </p:cNvPr>
+          <p:cNvCxnSpPr>
+            <a:cxnSpLocks/>
+            <a:stCxn id="27" idx="2"/>
+            <a:endCxn id="14" idx="0"/>
+          </p:cNvCxnSpPr>
+          <p:nvPr/>
+        </p:nvCxnSpPr>
+        <p:spPr>
+          <a:xfrm rot="5400000">
+            <a:off x="9119953" y="5051173"/>
+            <a:ext cx="485548" cy="1055"/>
+          </a:xfrm>
+          <a:prstGeom prst="bentConnector3">
+            <a:avLst>
+              <a:gd name="adj1" fmla="val 50000"/>
+            </a:avLst>
+          </a:prstGeom>
+          <a:ln w="19050">
+            <a:solidFill>
+              <a:schemeClr val="tx1"/>
+            </a:solidFill>
+            <a:tailEnd type="triangle"/>
+          </a:ln>
+        </p:spPr>
+        <p:style>
+          <a:lnRef idx="1">
+            <a:schemeClr val="accent1"/>
+          </a:lnRef>
+          <a:fillRef idx="0">
+            <a:schemeClr val="accent1"/>
+          </a:fillRef>
+          <a:effectRef idx="0">
+            <a:schemeClr val="accent1"/>
+          </a:effectRef>
+          <a:fontRef idx="minor">
+            <a:schemeClr val="tx1"/>
+          </a:fontRef>
+        </p:style>
+      </p:cxnSp>
+      <p:cxnSp>
+        <p:nvCxnSpPr>
+          <p:cNvPr id="47" name="肘形连接符 46">
+            <a:extLst>
+              <a:ext uri="{FF2B5EF4-FFF2-40B4-BE49-F238E27FC236}">
+                <a16:creationId xmlns:a16="http://schemas.microsoft.com/office/drawing/2014/main" id="{19E83585-8036-C043-BFD4-FF43BB4266DA}"/>
+              </a:ext>
+            </a:extLst>
+          </p:cNvPr>
+          <p:cNvCxnSpPr>
+            <a:cxnSpLocks/>
+            <a:stCxn id="25" idx="2"/>
+            <a:endCxn id="14" idx="0"/>
+          </p:cNvCxnSpPr>
+          <p:nvPr/>
+        </p:nvCxnSpPr>
+        <p:spPr>
+          <a:xfrm rot="5400000">
+            <a:off x="9904026" y="4267100"/>
+            <a:ext cx="485548" cy="1569201"/>
+          </a:xfrm>
+          <a:prstGeom prst="bentConnector3">
+            <a:avLst>
+              <a:gd name="adj1" fmla="val 50000"/>
+            </a:avLst>
+          </a:prstGeom>
+          <a:ln w="19050">
+            <a:solidFill>
+              <a:schemeClr val="tx1"/>
+            </a:solidFill>
+            <a:tailEnd type="triangle"/>
+          </a:ln>
+        </p:spPr>
+        <p:style>
+          <a:lnRef idx="1">
+            <a:schemeClr val="accent1"/>
+          </a:lnRef>
+          <a:fillRef idx="0">
+            <a:schemeClr val="accent1"/>
+          </a:fillRef>
+          <a:effectRef idx="0">
+            <a:schemeClr val="accent1"/>
+          </a:effectRef>
+          <a:fontRef idx="minor">
+            <a:schemeClr val="tx1"/>
+          </a:fontRef>
+        </p:style>
+      </p:cxnSp>
+      <p:cxnSp>
+        <p:nvCxnSpPr>
+          <p:cNvPr id="52" name="直线箭头连接符 51">
+            <a:extLst>
+              <a:ext uri="{FF2B5EF4-FFF2-40B4-BE49-F238E27FC236}">
+                <a16:creationId xmlns:a16="http://schemas.microsoft.com/office/drawing/2014/main" id="{59054971-B3F1-CD32-C1F3-00437611F05A}"/>
+              </a:ext>
+            </a:extLst>
+          </p:cNvPr>
+          <p:cNvCxnSpPr>
+            <a:cxnSpLocks/>
+            <a:stCxn id="17" idx="2"/>
+          </p:cNvCxnSpPr>
+          <p:nvPr/>
+        </p:nvCxnSpPr>
+        <p:spPr>
+          <a:xfrm>
+            <a:off x="2418566" y="3760406"/>
+            <a:ext cx="0" cy="223927"/>
+          </a:xfrm>
+          <a:prstGeom prst="straightConnector1">
+            <a:avLst/>
+          </a:prstGeom>
+          <a:ln w="19050">
+            <a:solidFill>
+              <a:schemeClr val="tx1"/>
+            </a:solidFill>
+            <a:tailEnd type="triangle"/>
+          </a:ln>
+        </p:spPr>
+        <p:style>
+          <a:lnRef idx="1">
+            <a:schemeClr val="accent1"/>
+          </a:lnRef>
+          <a:fillRef idx="0">
+            <a:schemeClr val="accent1"/>
+          </a:fillRef>
+          <a:effectRef idx="0">
+            <a:schemeClr val="accent1"/>
+          </a:effectRef>
+          <a:fontRef idx="minor">
+            <a:schemeClr val="tx1"/>
+          </a:fontRef>
+        </p:style>
+      </p:cxnSp>
+      <p:cxnSp>
+        <p:nvCxnSpPr>
+          <p:cNvPr id="54" name="直线箭头连接符 53">
+            <a:extLst>
+              <a:ext uri="{FF2B5EF4-FFF2-40B4-BE49-F238E27FC236}">
+                <a16:creationId xmlns:a16="http://schemas.microsoft.com/office/drawing/2014/main" id="{CEA12C4E-B0E4-07F8-DA76-5C7FC89A4D7B}"/>
+              </a:ext>
+            </a:extLst>
+          </p:cNvPr>
+          <p:cNvCxnSpPr>
+            <a:cxnSpLocks/>
+            <a:stCxn id="18" idx="2"/>
+          </p:cNvCxnSpPr>
+          <p:nvPr/>
+        </p:nvCxnSpPr>
+        <p:spPr>
+          <a:xfrm>
+            <a:off x="5196243" y="3760405"/>
+            <a:ext cx="0" cy="223928"/>
+          </a:xfrm>
+          <a:prstGeom prst="straightConnector1">
+            <a:avLst/>
+          </a:prstGeom>
+          <a:ln w="19050">
+            <a:solidFill>
+              <a:schemeClr val="tx1"/>
+            </a:solidFill>
+            <a:tailEnd type="triangle"/>
+          </a:ln>
+        </p:spPr>
+        <p:style>
+          <a:lnRef idx="1">
+            <a:schemeClr val="accent1"/>
+          </a:lnRef>
+          <a:fillRef idx="0">
+            <a:schemeClr val="accent1"/>
+          </a:fillRef>
+          <a:effectRef idx="0">
+            <a:schemeClr val="accent1"/>
+          </a:effectRef>
+          <a:fontRef idx="minor">
+            <a:schemeClr val="tx1"/>
+          </a:fontRef>
+        </p:style>
+      </p:cxnSp>
+      <p:cxnSp>
+        <p:nvCxnSpPr>
+          <p:cNvPr id="56" name="直线箭头连接符 55">
+            <a:extLst>
+              <a:ext uri="{FF2B5EF4-FFF2-40B4-BE49-F238E27FC236}">
+                <a16:creationId xmlns:a16="http://schemas.microsoft.com/office/drawing/2014/main" id="{FCD4660A-E8DC-FE4E-500B-5004EF4CA5A8}"/>
+              </a:ext>
+            </a:extLst>
+          </p:cNvPr>
+          <p:cNvCxnSpPr>
+            <a:cxnSpLocks/>
+            <a:stCxn id="15" idx="2"/>
+          </p:cNvCxnSpPr>
+          <p:nvPr/>
+        </p:nvCxnSpPr>
+        <p:spPr>
+          <a:xfrm>
+            <a:off x="7973921" y="3760405"/>
+            <a:ext cx="0" cy="223928"/>
+          </a:xfrm>
+          <a:prstGeom prst="straightConnector1">
+            <a:avLst/>
+          </a:prstGeom>
+          <a:ln w="19050">
+            <a:solidFill>
+              <a:schemeClr val="tx1"/>
+            </a:solidFill>
+            <a:tailEnd type="triangle"/>
+          </a:ln>
+        </p:spPr>
+        <p:style>
+          <a:lnRef idx="1">
+            <a:schemeClr val="accent1"/>
+          </a:lnRef>
+          <a:fillRef idx="0">
+            <a:schemeClr val="accent1"/>
+          </a:fillRef>
+          <a:effectRef idx="0">
+            <a:schemeClr val="accent1"/>
+          </a:effectRef>
+          <a:fontRef idx="minor">
+            <a:schemeClr val="tx1"/>
+          </a:fontRef>
+        </p:style>
+      </p:cxnSp>
+      <p:cxnSp>
+        <p:nvCxnSpPr>
+          <p:cNvPr id="57" name="直线箭头连接符 56">
+            <a:extLst>
+              <a:ext uri="{FF2B5EF4-FFF2-40B4-BE49-F238E27FC236}">
+                <a16:creationId xmlns:a16="http://schemas.microsoft.com/office/drawing/2014/main" id="{0D907545-3B74-6355-1794-19AA15A290B7}"/>
+              </a:ext>
+            </a:extLst>
+          </p:cNvPr>
+          <p:cNvCxnSpPr>
+            <a:cxnSpLocks/>
+            <a:stCxn id="16" idx="2"/>
+          </p:cNvCxnSpPr>
+          <p:nvPr/>
+        </p:nvCxnSpPr>
+        <p:spPr>
+          <a:xfrm>
+            <a:off x="10616440" y="3760405"/>
+            <a:ext cx="0" cy="223928"/>
+          </a:xfrm>
+          <a:prstGeom prst="straightConnector1">
+            <a:avLst/>
+          </a:prstGeom>
+          <a:ln w="19050">
+            <a:solidFill>
+              <a:schemeClr val="tx1"/>
+            </a:solidFill>
+            <a:tailEnd type="triangle"/>
+          </a:ln>
+        </p:spPr>
+        <p:style>
+          <a:lnRef idx="1">
+            <a:schemeClr val="accent1"/>
+          </a:lnRef>
+          <a:fillRef idx="0">
+            <a:schemeClr val="accent1"/>
+          </a:fillRef>
+          <a:effectRef idx="0">
+            <a:schemeClr val="accent1"/>
+          </a:effectRef>
+          <a:fontRef idx="minor">
+            <a:schemeClr val="tx1"/>
+          </a:fontRef>
+        </p:style>
+      </p:cxnSp>
+    </p:spTree>
+    <p:extLst>
+      <p:ext uri="{BB962C8B-B14F-4D97-AF65-F5344CB8AC3E}">
+        <p14:creationId xmlns:p14="http://schemas.microsoft.com/office/powerpoint/2010/main" val="3030279860"/>
       </p:ext>
     </p:extLst>
   </p:cSld>

</xml_diff>